<commit_message>
updated slides and added new notebooks
</commit_message>
<xml_diff>
--- a/Documents/60-Introduction.pptx
+++ b/Documents/60-Introduction.pptx
@@ -5,29 +5,30 @@
     <p:sldMasterId id="2147483648" r:id="rId1"/>
   </p:sldMasterIdLst>
   <p:notesMasterIdLst>
-    <p:notesMasterId r:id="rId19"/>
+    <p:notesMasterId r:id="rId20"/>
   </p:notesMasterIdLst>
   <p:handoutMasterIdLst>
-    <p:handoutMasterId r:id="rId20"/>
+    <p:handoutMasterId r:id="rId21"/>
   </p:handoutMasterIdLst>
   <p:sldIdLst>
     <p:sldId id="259" r:id="rId2"/>
     <p:sldId id="278" r:id="rId3"/>
     <p:sldId id="279" r:id="rId4"/>
     <p:sldId id="280" r:id="rId5"/>
-    <p:sldId id="281" r:id="rId6"/>
-    <p:sldId id="282" r:id="rId7"/>
-    <p:sldId id="283" r:id="rId8"/>
-    <p:sldId id="284" r:id="rId9"/>
-    <p:sldId id="285" r:id="rId10"/>
-    <p:sldId id="286" r:id="rId11"/>
-    <p:sldId id="288" r:id="rId12"/>
-    <p:sldId id="287" r:id="rId13"/>
-    <p:sldId id="289" r:id="rId14"/>
+    <p:sldId id="294" r:id="rId6"/>
+    <p:sldId id="281" r:id="rId7"/>
+    <p:sldId id="282" r:id="rId8"/>
+    <p:sldId id="283" r:id="rId9"/>
+    <p:sldId id="284" r:id="rId10"/>
+    <p:sldId id="285" r:id="rId11"/>
+    <p:sldId id="286" r:id="rId12"/>
+    <p:sldId id="288" r:id="rId13"/>
+    <p:sldId id="287" r:id="rId14"/>
     <p:sldId id="290" r:id="rId15"/>
-    <p:sldId id="291" r:id="rId16"/>
-    <p:sldId id="292" r:id="rId17"/>
-    <p:sldId id="293" r:id="rId18"/>
+    <p:sldId id="289" r:id="rId16"/>
+    <p:sldId id="291" r:id="rId17"/>
+    <p:sldId id="292" r:id="rId18"/>
+    <p:sldId id="293" r:id="rId19"/>
   </p:sldIdLst>
   <p:sldSz cx="9144000" cy="6858000" type="screen4x3"/>
   <p:notesSz cx="6858000" cy="9144000"/>
@@ -4598,7 +4599,7 @@
           <a:p>
             <a:r>
               <a:rPr lang="en-US" dirty="0" smtClean="0"/>
-              <a:t>How to determine the alpha’s</a:t>
+              <a:t>Prediction model</a:t>
             </a:r>
             <a:endParaRPr lang="en-US" dirty="0"/>
           </a:p>
@@ -4617,50 +4618,118 @@
         <p:spPr/>
         <p:txBody>
           <a:bodyPr>
-            <a:normAutofit fontScale="92500" lnSpcReduction="10000"/>
+            <a:normAutofit fontScale="62500" lnSpcReduction="20000"/>
           </a:bodyPr>
           <a:lstStyle/>
           <a:p>
             <a:r>
               <a:rPr lang="en-US" dirty="0" smtClean="0"/>
-              <a:t>Suppose you start with [alpha1=0.5, alpha2=0.5]</a:t>
-            </a:r>
-          </a:p>
-          <a:p>
-            <a:r>
-              <a:rPr lang="en-US" dirty="0" smtClean="0"/>
-              <a:t>Now you could loop through the given data set, and determine how many predictions were incorrect.</a:t>
-            </a:r>
+              <a:t>Simple:  if homeowner, loan will be good</a:t>
+            </a:r>
+          </a:p>
+          <a:p>
+            <a:endParaRPr lang="en-US" dirty="0" smtClean="0"/>
+          </a:p>
+          <a:p>
+            <a:r>
+              <a:rPr lang="en-US" dirty="0" smtClean="0"/>
+              <a:t>Better:  if homeowner and employed, loan will be good</a:t>
+            </a:r>
+          </a:p>
+          <a:p>
+            <a:endParaRPr lang="en-US" dirty="0" smtClean="0"/>
+          </a:p>
+          <a:p>
+            <a:r>
+              <a:rPr lang="en-US" dirty="0" smtClean="0"/>
+              <a:t>Better:  P(good) = 0.3 * (1 if homeowner) +0 .7 * (1 if employed)  </a:t>
+            </a:r>
+            <a:endParaRPr lang="en-US" dirty="0"/>
+          </a:p>
+          <a:p>
+            <a:endParaRPr lang="en-US" dirty="0" smtClean="0"/>
+          </a:p>
+          <a:p>
+            <a:endParaRPr lang="en-US" dirty="0"/>
+          </a:p>
+          <a:p>
+            <a:r>
+              <a:rPr lang="en-US" dirty="0" smtClean="0"/>
+              <a:t>In </a:t>
+            </a:r>
+            <a:r>
+              <a:rPr lang="en-US" dirty="0"/>
+              <a:t>general, the computed probability that a loan will be good is:</a:t>
+            </a:r>
+          </a:p>
+          <a:p>
+            <a:pPr marL="0" indent="0">
+              <a:buNone/>
+            </a:pPr>
+            <a:endParaRPr lang="en-US" dirty="0"/>
           </a:p>
           <a:p>
             <a:pPr lvl="1"/>
             <a:r>
-              <a:rPr lang="en-US" dirty="0" smtClean="0"/>
-              <a:t>We call this the “error” or “cost”</a:t>
-            </a:r>
-          </a:p>
-          <a:p>
-            <a:r>
-              <a:rPr lang="en-US" dirty="0" smtClean="0"/>
-              <a:t>We can also calculate the first derivative </a:t>
-            </a:r>
-            <a:r>
-              <a:rPr lang="en-US" dirty="0" err="1" smtClean="0"/>
-              <a:t>w.r.t</a:t>
-            </a:r>
-            <a:r>
-              <a:rPr lang="en-US" dirty="0" smtClean="0"/>
-              <a:t>. alpha1 and also alpha2</a:t>
-            </a:r>
-          </a:p>
-          <a:p>
-            <a:r>
-              <a:rPr lang="en-US" dirty="0" smtClean="0"/>
-              <a:t>Since we are minimizing the cost, take a step backwards in the direction of the derivative.</a:t>
-            </a:r>
-          </a:p>
-          <a:p>
-            <a:pPr lvl="1"/>
+              <a:rPr lang="en-US" dirty="0"/>
+              <a:t> </a:t>
+            </a:r>
+            <a:r>
+              <a:rPr lang="en-US" dirty="0" smtClean="0"/>
+              <a:t>P</a:t>
+            </a:r>
+            <a:r>
+              <a:rPr lang="en-US" dirty="0"/>
+              <a:t>(good) = </a:t>
+            </a:r>
+            <a:r>
+              <a:rPr lang="en-US" dirty="0" smtClean="0"/>
+              <a:t>theta1* </a:t>
+            </a:r>
+            <a:r>
+              <a:rPr lang="en-US" dirty="0"/>
+              <a:t>feature1 + </a:t>
+            </a:r>
+            <a:r>
+              <a:rPr lang="en-US" dirty="0" smtClean="0"/>
+              <a:t>theta2* </a:t>
+            </a:r>
+            <a:r>
+              <a:rPr lang="en-US" dirty="0"/>
+              <a:t>feature2 + </a:t>
+            </a:r>
+            <a:r>
+              <a:rPr lang="en-US" dirty="0" smtClean="0"/>
+              <a:t>theta3* </a:t>
+            </a:r>
+            <a:r>
+              <a:rPr lang="en-US" dirty="0"/>
+              <a:t>feature3 + …</a:t>
+            </a:r>
+          </a:p>
+          <a:p>
+            <a:endParaRPr lang="en-US" dirty="0"/>
+          </a:p>
+          <a:p>
+            <a:r>
+              <a:rPr lang="en-US" dirty="0"/>
+              <a:t>We need to select the most useful features, and we need to find the best values of the </a:t>
+            </a:r>
+            <a:r>
+              <a:rPr lang="en-US" dirty="0" smtClean="0"/>
+              <a:t>thetas using </a:t>
+            </a:r>
+            <a:r>
+              <a:rPr lang="en-US" dirty="0"/>
+              <a:t>the training data </a:t>
+            </a:r>
+            <a:r>
+              <a:rPr lang="en-US" dirty="0" smtClean="0"/>
+              <a:t>set.</a:t>
+            </a:r>
+            <a:endParaRPr lang="en-US" dirty="0"/>
+          </a:p>
+          <a:p>
             <a:endParaRPr lang="en-US" dirty="0"/>
           </a:p>
         </p:txBody>
@@ -4668,7 +4737,7 @@
     </p:spTree>
     <p:extLst>
       <p:ext uri="{BB962C8B-B14F-4D97-AF65-F5344CB8AC3E}">
-        <p14:creationId xmlns:p14="http://schemas.microsoft.com/office/powerpoint/2010/main" val="3806612761"/>
+        <p14:creationId xmlns:p14="http://schemas.microsoft.com/office/powerpoint/2010/main" val="3273536355"/>
       </p:ext>
     </p:extLst>
   </p:cSld>
@@ -4715,7 +4784,171 @@
           <a:p>
             <a:r>
               <a:rPr lang="en-US" dirty="0" smtClean="0"/>
-              <a:t>Taking Iterative steps</a:t>
+              <a:t>How to determine the alpha’s</a:t>
+            </a:r>
+            <a:endParaRPr lang="en-US" dirty="0"/>
+          </a:p>
+        </p:txBody>
+      </p:sp>
+      <p:sp>
+        <p:nvSpPr>
+          <p:cNvPr id="3" name="Content Placeholder 2"/>
+          <p:cNvSpPr>
+            <a:spLocks noGrp="1"/>
+          </p:cNvSpPr>
+          <p:nvPr>
+            <p:ph idx="1"/>
+          </p:nvPr>
+        </p:nvSpPr>
+        <p:spPr/>
+        <p:txBody>
+          <a:bodyPr>
+            <a:normAutofit fontScale="92500" lnSpcReduction="10000"/>
+          </a:bodyPr>
+          <a:lstStyle/>
+          <a:p>
+            <a:r>
+              <a:rPr lang="en-US" dirty="0" smtClean="0"/>
+              <a:t>Suppose you start with </a:t>
+            </a:r>
+            <a:r>
+              <a:rPr lang="en-US" dirty="0" smtClean="0"/>
+              <a:t>[theta1=0.3, theta2=0.7]</a:t>
+            </a:r>
+            <a:endParaRPr lang="en-US" dirty="0" smtClean="0"/>
+          </a:p>
+          <a:p>
+            <a:r>
+              <a:rPr lang="en-US" dirty="0" smtClean="0"/>
+              <a:t>Now you could loop through the given data set, and determine how many predictions were incorrect.</a:t>
+            </a:r>
+          </a:p>
+          <a:p>
+            <a:pPr lvl="1"/>
+            <a:r>
+              <a:rPr lang="en-US" dirty="0" smtClean="0"/>
+              <a:t>We call this the </a:t>
+            </a:r>
+            <a:r>
+              <a:rPr lang="en-US" dirty="0" smtClean="0"/>
+              <a:t>“cost” </a:t>
+            </a:r>
+            <a:r>
+              <a:rPr lang="en-US" dirty="0" smtClean="0"/>
+              <a:t>or </a:t>
+            </a:r>
+            <a:r>
+              <a:rPr lang="en-US" dirty="0" smtClean="0"/>
+              <a:t>“</a:t>
+            </a:r>
+            <a:r>
+              <a:rPr lang="en-US" dirty="0" smtClean="0"/>
+              <a:t>loss</a:t>
+            </a:r>
+            <a:r>
+              <a:rPr lang="en-US" dirty="0" smtClean="0"/>
+              <a:t>”</a:t>
+            </a:r>
+            <a:endParaRPr lang="en-US" dirty="0" smtClean="0"/>
+          </a:p>
+          <a:p>
+            <a:r>
+              <a:rPr lang="en-US" dirty="0" smtClean="0"/>
+              <a:t>We can also calculate the first derivative </a:t>
+            </a:r>
+            <a:r>
+              <a:rPr lang="en-US" dirty="0" smtClean="0"/>
+              <a:t>of cost </a:t>
+            </a:r>
+            <a:r>
+              <a:rPr lang="en-US" dirty="0" err="1" smtClean="0"/>
+              <a:t>w.r.t</a:t>
+            </a:r>
+            <a:r>
+              <a:rPr lang="en-US" dirty="0" smtClean="0"/>
+              <a:t>. </a:t>
+            </a:r>
+            <a:r>
+              <a:rPr lang="en-US" dirty="0" smtClean="0"/>
+              <a:t>theta1 and </a:t>
+            </a:r>
+            <a:r>
+              <a:rPr lang="en-US" dirty="0" smtClean="0"/>
+              <a:t>also </a:t>
+            </a:r>
+            <a:r>
+              <a:rPr lang="en-US" dirty="0" smtClean="0"/>
+              <a:t>theta2</a:t>
+            </a:r>
+            <a:endParaRPr lang="en-US" dirty="0" smtClean="0"/>
+          </a:p>
+          <a:p>
+            <a:r>
+              <a:rPr lang="en-US" dirty="0" smtClean="0"/>
+              <a:t>Since we are minimizing the cost, take a step backwards in the direction of the derivative.</a:t>
+            </a:r>
+          </a:p>
+          <a:p>
+            <a:pPr lvl="1"/>
+            <a:endParaRPr lang="en-US" dirty="0"/>
+          </a:p>
+        </p:txBody>
+      </p:sp>
+    </p:spTree>
+    <p:extLst>
+      <p:ext uri="{BB962C8B-B14F-4D97-AF65-F5344CB8AC3E}">
+        <p14:creationId xmlns:p14="http://schemas.microsoft.com/office/powerpoint/2010/main" val="3806612761"/>
+      </p:ext>
+    </p:extLst>
+  </p:cSld>
+  <p:clrMapOvr>
+    <a:masterClrMapping/>
+  </p:clrMapOvr>
+  <p:transition xmlns:p14="http://schemas.microsoft.com/office/powerpoint/2010/main" spd="slow">
+    <p:wipe dir="d"/>
+  </p:transition>
+</p:sld>
+</file>
+
+<file path=ppt/slides/slide12.xml><?xml version="1.0" encoding="utf-8"?>
+<p:sld xmlns:a="http://schemas.openxmlformats.org/drawingml/2006/main" xmlns:r="http://schemas.openxmlformats.org/officeDocument/2006/relationships" xmlns:p="http://schemas.openxmlformats.org/presentationml/2006/main">
+  <p:cSld>
+    <p:spTree>
+      <p:nvGrpSpPr>
+        <p:cNvPr id="1" name=""/>
+        <p:cNvGrpSpPr/>
+        <p:nvPr/>
+      </p:nvGrpSpPr>
+      <p:grpSpPr>
+        <a:xfrm>
+          <a:off x="0" y="0"/>
+          <a:ext cx="0" cy="0"/>
+          <a:chOff x="0" y="0"/>
+          <a:chExt cx="0" cy="0"/>
+        </a:xfrm>
+      </p:grpSpPr>
+      <p:sp>
+        <p:nvSpPr>
+          <p:cNvPr id="2" name="Title 1"/>
+          <p:cNvSpPr>
+            <a:spLocks noGrp="1"/>
+          </p:cNvSpPr>
+          <p:nvPr>
+            <p:ph type="title"/>
+          </p:nvPr>
+        </p:nvSpPr>
+        <p:spPr/>
+        <p:txBody>
+          <a:bodyPr/>
+          <a:lstStyle/>
+          <a:p>
+            <a:r>
+              <a:rPr lang="en-US" dirty="0" smtClean="0"/>
+              <a:t>Taking Iterative </a:t>
+            </a:r>
+            <a:r>
+              <a:rPr lang="en-US" dirty="0" smtClean="0"/>
+              <a:t>Steps</a:t>
             </a:r>
             <a:endParaRPr lang="en-US" dirty="0"/>
           </a:p>
@@ -4761,7 +4994,7 @@
 </p:sld>
 </file>
 
-<file path=ppt/slides/slide12.xml><?xml version="1.0" encoding="utf-8"?>
+<file path=ppt/slides/slide13.xml><?xml version="1.0" encoding="utf-8"?>
 <p:sld xmlns:a="http://schemas.openxmlformats.org/drawingml/2006/main" xmlns:r="http://schemas.openxmlformats.org/officeDocument/2006/relationships" xmlns:p="http://schemas.openxmlformats.org/presentationml/2006/main">
   <p:cSld>
     <p:spTree>
@@ -4841,139 +5074,6 @@
 </p:sld>
 </file>
 
-<file path=ppt/slides/slide13.xml><?xml version="1.0" encoding="utf-8"?>
-<p:sld xmlns:a="http://schemas.openxmlformats.org/drawingml/2006/main" xmlns:r="http://schemas.openxmlformats.org/officeDocument/2006/relationships" xmlns:p="http://schemas.openxmlformats.org/presentationml/2006/main">
-  <p:cSld>
-    <p:spTree>
-      <p:nvGrpSpPr>
-        <p:cNvPr id="1" name=""/>
-        <p:cNvGrpSpPr/>
-        <p:nvPr/>
-      </p:nvGrpSpPr>
-      <p:grpSpPr>
-        <a:xfrm>
-          <a:off x="0" y="0"/>
-          <a:ext cx="0" cy="0"/>
-          <a:chOff x="0" y="0"/>
-          <a:chExt cx="0" cy="0"/>
-        </a:xfrm>
-      </p:grpSpPr>
-      <p:sp>
-        <p:nvSpPr>
-          <p:cNvPr id="2" name="Title 1"/>
-          <p:cNvSpPr>
-            <a:spLocks noGrp="1"/>
-          </p:cNvSpPr>
-          <p:nvPr>
-            <p:ph type="title"/>
-          </p:nvPr>
-        </p:nvSpPr>
-        <p:spPr/>
-        <p:txBody>
-          <a:bodyPr/>
-          <a:lstStyle/>
-          <a:p>
-            <a:r>
-              <a:rPr lang="en-US" dirty="0" smtClean="0"/>
-              <a:t>This is called Multiple Regression</a:t>
-            </a:r>
-            <a:endParaRPr lang="en-US" dirty="0"/>
-          </a:p>
-        </p:txBody>
-      </p:sp>
-      <p:sp>
-        <p:nvSpPr>
-          <p:cNvPr id="3" name="Content Placeholder 2"/>
-          <p:cNvSpPr>
-            <a:spLocks noGrp="1"/>
-          </p:cNvSpPr>
-          <p:nvPr>
-            <p:ph idx="1"/>
-          </p:nvPr>
-        </p:nvSpPr>
-        <p:spPr>
-          <a:xfrm>
-            <a:off x="762000" y="1596413"/>
-            <a:ext cx="8077200" cy="5261587"/>
-          </a:xfrm>
-        </p:spPr>
-        <p:txBody>
-          <a:bodyPr>
-            <a:normAutofit fontScale="62500" lnSpcReduction="20000"/>
-          </a:bodyPr>
-          <a:lstStyle/>
-          <a:p>
-            <a:r>
-              <a:rPr lang="en-US" dirty="0" smtClean="0"/>
-              <a:t>Extending from 2 alphas to several alphas</a:t>
-            </a:r>
-          </a:p>
-          <a:p>
-            <a:endParaRPr lang="en-US" dirty="0"/>
-          </a:p>
-          <a:p>
-            <a:endParaRPr lang="en-US" dirty="0" smtClean="0"/>
-          </a:p>
-          <a:p>
-            <a:r>
-              <a:rPr lang="en-US" dirty="0"/>
-              <a:t>Step 1: Initialize the weights(a &amp; b) with random values and calculate Error (SSE)</a:t>
-            </a:r>
-          </a:p>
-          <a:p>
-            <a:endParaRPr lang="en-US" dirty="0"/>
-          </a:p>
-          <a:p>
-            <a:r>
-              <a:rPr lang="en-US" dirty="0"/>
-              <a:t>Step 2: Calculate the gradient i.e. change in SSE when the weights (a &amp; b) are changed by a very small value from their original randomly initialized value. This helps us move the values of a &amp; b in the direction in which SSE is minimized.</a:t>
-            </a:r>
-          </a:p>
-          <a:p>
-            <a:endParaRPr lang="en-US" dirty="0"/>
-          </a:p>
-          <a:p>
-            <a:r>
-              <a:rPr lang="en-US" dirty="0"/>
-              <a:t>Step 3: Adjust the weights with the gradients to reach the optimal values where SSE is minimized</a:t>
-            </a:r>
-          </a:p>
-          <a:p>
-            <a:endParaRPr lang="en-US" dirty="0"/>
-          </a:p>
-          <a:p>
-            <a:r>
-              <a:rPr lang="en-US" dirty="0"/>
-              <a:t>Step 4: Use the new weights for prediction and to calculate the new SSE</a:t>
-            </a:r>
-          </a:p>
-          <a:p>
-            <a:endParaRPr lang="en-US" dirty="0"/>
-          </a:p>
-          <a:p>
-            <a:r>
-              <a:rPr lang="en-US" dirty="0"/>
-              <a:t>Step 5: Repeat steps 2 and 3 till further adjustments to weights doesn’t significantly reduce the Error</a:t>
-            </a:r>
-          </a:p>
-        </p:txBody>
-      </p:sp>
-    </p:spTree>
-    <p:extLst>
-      <p:ext uri="{BB962C8B-B14F-4D97-AF65-F5344CB8AC3E}">
-        <p14:creationId xmlns:p14="http://schemas.microsoft.com/office/powerpoint/2010/main" val="2779996801"/>
-      </p:ext>
-    </p:extLst>
-  </p:cSld>
-  <p:clrMapOvr>
-    <a:masterClrMapping/>
-  </p:clrMapOvr>
-  <p:transition xmlns:p14="http://schemas.microsoft.com/office/powerpoint/2010/main" spd="slow">
-    <p:wipe dir="d"/>
-  </p:transition>
-</p:sld>
-</file>
-
 <file path=ppt/slides/slide14.xml><?xml version="1.0" encoding="utf-8"?>
 <p:sld xmlns:a="http://schemas.openxmlformats.org/drawingml/2006/main" xmlns:r="http://schemas.openxmlformats.org/officeDocument/2006/relationships" xmlns:p="http://schemas.openxmlformats.org/presentationml/2006/main">
   <p:cSld>
@@ -5010,7 +5110,15 @@
           <a:p>
             <a:r>
               <a:rPr lang="en-US" dirty="0" smtClean="0"/>
-              <a:t>The error (cost) will be reduced for each iteration</a:t>
+              <a:t>The </a:t>
+            </a:r>
+            <a:r>
+              <a:rPr lang="en-US" dirty="0" smtClean="0"/>
+              <a:t>cost (error) </a:t>
+            </a:r>
+            <a:r>
+              <a:rPr lang="en-US" dirty="0" smtClean="0"/>
+              <a:t>will be reduced for each iteration</a:t>
             </a:r>
             <a:endParaRPr lang="en-US" dirty="0"/>
           </a:p>
@@ -5090,7 +5198,7 @@
           <a:p>
             <a:r>
               <a:rPr lang="en-US" dirty="0" smtClean="0"/>
-              <a:t>Result</a:t>
+              <a:t>This is called Multiple Regression</a:t>
             </a:r>
             <a:endParaRPr lang="en-US" dirty="0"/>
           </a:p>
@@ -5106,94 +5214,82 @@
             <p:ph idx="1"/>
           </p:nvPr>
         </p:nvSpPr>
-        <p:spPr/>
+        <p:spPr>
+          <a:xfrm>
+            <a:off x="762000" y="1596413"/>
+            <a:ext cx="8077200" cy="5261587"/>
+          </a:xfrm>
+        </p:spPr>
         <p:txBody>
           <a:bodyPr>
-            <a:normAutofit fontScale="92500" lnSpcReduction="20000"/>
+            <a:normAutofit fontScale="62500" lnSpcReduction="20000"/>
           </a:bodyPr>
           <a:lstStyle/>
           <a:p>
             <a:r>
               <a:rPr lang="en-US" dirty="0" smtClean="0"/>
-              <a:t>P(good) = </a:t>
-            </a:r>
-            <a:endParaRPr lang="en-US" dirty="0"/>
+              <a:t>Extending from 2 </a:t>
+            </a:r>
+            <a:r>
+              <a:rPr lang="en-US" dirty="0" smtClean="0"/>
+              <a:t>thetas to </a:t>
+            </a:r>
+            <a:r>
+              <a:rPr lang="en-US" dirty="0" smtClean="0"/>
+              <a:t>several </a:t>
+            </a:r>
+            <a:r>
+              <a:rPr lang="en-US" dirty="0" smtClean="0"/>
+              <a:t>thetas.  Call them “weights”.</a:t>
+            </a:r>
+            <a:endParaRPr lang="en-US" dirty="0" smtClean="0"/>
+          </a:p>
+          <a:p>
+            <a:endParaRPr lang="en-US" dirty="0"/>
+          </a:p>
+          <a:p>
+            <a:endParaRPr lang="en-US" dirty="0" smtClean="0"/>
           </a:p>
           <a:p>
             <a:r>
               <a:rPr lang="en-US" dirty="0"/>
-              <a:t>  </a:t>
-            </a:r>
-            <a:r>
-              <a:rPr lang="en-US" dirty="0" smtClean="0"/>
-              <a:t>0.08 * debt/</a:t>
-            </a:r>
-            <a:r>
-              <a:rPr lang="en-US" dirty="0" err="1" smtClean="0"/>
-              <a:t>equityRatio</a:t>
-            </a:r>
-            <a:r>
-              <a:rPr lang="en-US" dirty="0" smtClean="0"/>
-              <a:t> +</a:t>
-            </a:r>
+              <a:t>Step 1: Initialize the weights(a &amp; b) with random values and calculate Error (SSE)</a:t>
+            </a:r>
+          </a:p>
+          <a:p>
+            <a:endParaRPr lang="en-US" dirty="0"/>
           </a:p>
           <a:p>
             <a:r>
               <a:rPr lang="en-US" dirty="0"/>
-              <a:t> </a:t>
-            </a:r>
-            <a:r>
-              <a:rPr lang="en-US" dirty="0" smtClean="0"/>
-              <a:t> 0.06 * </a:t>
-            </a:r>
-            <a:r>
-              <a:rPr lang="en-US" dirty="0" err="1" smtClean="0"/>
-              <a:t>isHomeOwner</a:t>
-            </a:r>
-            <a:r>
-              <a:rPr lang="en-US" dirty="0" smtClean="0"/>
-              <a:t> +</a:t>
-            </a:r>
-          </a:p>
-          <a:p>
-            <a:r>
-              <a:rPr lang="en-US" dirty="0" smtClean="0"/>
-              <a:t>  0.04 * </a:t>
-            </a:r>
-            <a:r>
-              <a:rPr lang="en-US" dirty="0" err="1" smtClean="0"/>
-              <a:t>employmentStatus</a:t>
-            </a:r>
-            <a:r>
-              <a:rPr lang="en-US" dirty="0" smtClean="0"/>
-              <a:t> + </a:t>
-            </a:r>
+              <a:t>Step 2: Calculate the gradient i.e. change in SSE when the weights (a &amp; b) are changed by a very small value from their original randomly initialized value. This helps us move the values of a &amp; b in the direction in which SSE is minimized.</a:t>
+            </a:r>
+          </a:p>
+          <a:p>
+            <a:endParaRPr lang="en-US" dirty="0"/>
           </a:p>
           <a:p>
             <a:r>
               <a:rPr lang="en-US" dirty="0"/>
-              <a:t> </a:t>
-            </a:r>
-            <a:r>
-              <a:rPr lang="en-US" dirty="0" smtClean="0"/>
-              <a:t> 0.028 * </a:t>
-            </a:r>
-            <a:r>
-              <a:rPr lang="en-US" dirty="0" err="1" smtClean="0"/>
-              <a:t>employmentDuration</a:t>
-            </a:r>
-            <a:r>
-              <a:rPr lang="en-US" dirty="0" smtClean="0"/>
-              <a:t> ...</a:t>
-            </a:r>
-          </a:p>
-          <a:p>
-            <a:endParaRPr lang="en-US" dirty="0"/>
-          </a:p>
-          <a:p>
-            <a:r>
-              <a:rPr lang="en-US" dirty="0" smtClean="0"/>
-              <a:t>This model shows the most important features.  We training alphas for all 60+ features, but we will keep only those with the high coefficients.</a:t>
+              <a:t>Step 3: Adjust the weights with the gradients to reach the optimal values where SSE is minimized</a:t>
+            </a:r>
+          </a:p>
+          <a:p>
+            <a:endParaRPr lang="en-US" dirty="0"/>
+          </a:p>
+          <a:p>
+            <a:r>
+              <a:rPr lang="en-US" dirty="0"/>
+              <a:t>Step 4: Use the new weights for prediction and to calculate the new SSE</a:t>
+            </a:r>
+          </a:p>
+          <a:p>
+            <a:endParaRPr lang="en-US" dirty="0"/>
+          </a:p>
+          <a:p>
+            <a:r>
+              <a:rPr lang="en-US" dirty="0"/>
+              <a:t>Step 5: Repeat steps 2 and 3 till further adjustments to weights doesn’t significantly reduce the Error</a:t>
             </a:r>
           </a:p>
         </p:txBody>
@@ -5201,7 +5297,7 @@
     </p:spTree>
     <p:extLst>
       <p:ext uri="{BB962C8B-B14F-4D97-AF65-F5344CB8AC3E}">
-        <p14:creationId xmlns:p14="http://schemas.microsoft.com/office/powerpoint/2010/main" val="3707314527"/>
+        <p14:creationId xmlns:p14="http://schemas.microsoft.com/office/powerpoint/2010/main" val="2779996801"/>
       </p:ext>
     </p:extLst>
   </p:cSld>
@@ -5243,6 +5339,176 @@
         </p:nvSpPr>
         <p:spPr/>
         <p:txBody>
+          <a:bodyPr/>
+          <a:lstStyle/>
+          <a:p>
+            <a:r>
+              <a:rPr lang="en-US" dirty="0" smtClean="0"/>
+              <a:t>Result</a:t>
+            </a:r>
+            <a:endParaRPr lang="en-US" dirty="0"/>
+          </a:p>
+        </p:txBody>
+      </p:sp>
+      <p:sp>
+        <p:nvSpPr>
+          <p:cNvPr id="3" name="Content Placeholder 2"/>
+          <p:cNvSpPr>
+            <a:spLocks noGrp="1"/>
+          </p:cNvSpPr>
+          <p:nvPr>
+            <p:ph idx="1"/>
+          </p:nvPr>
+        </p:nvSpPr>
+        <p:spPr/>
+        <p:txBody>
+          <a:bodyPr>
+            <a:normAutofit fontScale="85000" lnSpcReduction="10000"/>
+          </a:bodyPr>
+          <a:lstStyle/>
+          <a:p>
+            <a:r>
+              <a:rPr lang="en-US" dirty="0" smtClean="0"/>
+              <a:t>P(good) = </a:t>
+            </a:r>
+            <a:endParaRPr lang="en-US" dirty="0"/>
+          </a:p>
+          <a:p>
+            <a:r>
+              <a:rPr lang="en-US" dirty="0"/>
+              <a:t>  </a:t>
+            </a:r>
+            <a:r>
+              <a:rPr lang="en-US" dirty="0" smtClean="0"/>
+              <a:t>0.18 </a:t>
+            </a:r>
+            <a:r>
+              <a:rPr lang="en-US" dirty="0" smtClean="0"/>
+              <a:t>* debt/</a:t>
+            </a:r>
+            <a:r>
+              <a:rPr lang="en-US" dirty="0" err="1" smtClean="0"/>
+              <a:t>equityRatio</a:t>
+            </a:r>
+            <a:r>
+              <a:rPr lang="en-US" dirty="0" smtClean="0"/>
+              <a:t> +</a:t>
+            </a:r>
+          </a:p>
+          <a:p>
+            <a:r>
+              <a:rPr lang="en-US" dirty="0"/>
+              <a:t> </a:t>
+            </a:r>
+            <a:r>
+              <a:rPr lang="en-US" dirty="0" smtClean="0"/>
+              <a:t> 0.06 * </a:t>
+            </a:r>
+            <a:r>
+              <a:rPr lang="en-US" dirty="0" err="1" smtClean="0"/>
+              <a:t>isHomeOwner</a:t>
+            </a:r>
+            <a:r>
+              <a:rPr lang="en-US" dirty="0" smtClean="0"/>
+              <a:t> +</a:t>
+            </a:r>
+          </a:p>
+          <a:p>
+            <a:r>
+              <a:rPr lang="en-US" dirty="0" smtClean="0"/>
+              <a:t>  0.04 * </a:t>
+            </a:r>
+            <a:r>
+              <a:rPr lang="en-US" dirty="0" err="1" smtClean="0"/>
+              <a:t>employmentStatus</a:t>
+            </a:r>
+            <a:r>
+              <a:rPr lang="en-US" dirty="0" smtClean="0"/>
+              <a:t> + </a:t>
+            </a:r>
+          </a:p>
+          <a:p>
+            <a:r>
+              <a:rPr lang="en-US" dirty="0"/>
+              <a:t> </a:t>
+            </a:r>
+            <a:r>
+              <a:rPr lang="en-US" dirty="0" smtClean="0"/>
+              <a:t> 0.028 * </a:t>
+            </a:r>
+            <a:r>
+              <a:rPr lang="en-US" dirty="0" err="1" smtClean="0"/>
+              <a:t>employmentDuration</a:t>
+            </a:r>
+            <a:r>
+              <a:rPr lang="en-US" dirty="0" smtClean="0"/>
+              <a:t> ...</a:t>
+            </a:r>
+          </a:p>
+          <a:p>
+            <a:endParaRPr lang="en-US" dirty="0"/>
+          </a:p>
+          <a:p>
+            <a:r>
+              <a:rPr lang="en-US" dirty="0" smtClean="0"/>
+              <a:t>This model shows the most important features.  We </a:t>
+            </a:r>
+            <a:r>
+              <a:rPr lang="en-US" dirty="0" smtClean="0"/>
+              <a:t>will find via training thetas for </a:t>
+            </a:r>
+            <a:r>
+              <a:rPr lang="en-US" dirty="0" smtClean="0"/>
+              <a:t>all 60+ features, but we will keep only those with the high coefficients.</a:t>
+            </a:r>
+          </a:p>
+        </p:txBody>
+      </p:sp>
+    </p:spTree>
+    <p:extLst>
+      <p:ext uri="{BB962C8B-B14F-4D97-AF65-F5344CB8AC3E}">
+        <p14:creationId xmlns:p14="http://schemas.microsoft.com/office/powerpoint/2010/main" val="3707314527"/>
+      </p:ext>
+    </p:extLst>
+  </p:cSld>
+  <p:clrMapOvr>
+    <a:masterClrMapping/>
+  </p:clrMapOvr>
+  <p:transition xmlns:p14="http://schemas.microsoft.com/office/powerpoint/2010/main" spd="slow">
+    <p:wipe dir="d"/>
+  </p:transition>
+</p:sld>
+</file>
+
+<file path=ppt/slides/slide17.xml><?xml version="1.0" encoding="utf-8"?>
+<p:sld xmlns:a="http://schemas.openxmlformats.org/drawingml/2006/main" xmlns:r="http://schemas.openxmlformats.org/officeDocument/2006/relationships" xmlns:p="http://schemas.openxmlformats.org/presentationml/2006/main">
+  <p:cSld>
+    <p:spTree>
+      <p:nvGrpSpPr>
+        <p:cNvPr id="1" name=""/>
+        <p:cNvGrpSpPr/>
+        <p:nvPr/>
+      </p:nvGrpSpPr>
+      <p:grpSpPr>
+        <a:xfrm>
+          <a:off x="0" y="0"/>
+          <a:ext cx="0" cy="0"/>
+          <a:chOff x="0" y="0"/>
+          <a:chExt cx="0" cy="0"/>
+        </a:xfrm>
+      </p:grpSpPr>
+      <p:sp>
+        <p:nvSpPr>
+          <p:cNvPr id="2" name="Title 1"/>
+          <p:cNvSpPr>
+            <a:spLocks noGrp="1"/>
+          </p:cNvSpPr>
+          <p:nvPr>
+            <p:ph type="title"/>
+          </p:nvPr>
+        </p:nvSpPr>
+        <p:spPr/>
+        <p:txBody>
           <a:bodyPr>
             <a:normAutofit/>
           </a:bodyPr>
@@ -5323,7 +5589,7 @@
 </p:sld>
 </file>
 
-<file path=ppt/slides/slide17.xml><?xml version="1.0" encoding="utf-8"?>
+<file path=ppt/slides/slide18.xml><?xml version="1.0" encoding="utf-8"?>
 <p:sld xmlns:a="http://schemas.openxmlformats.org/drawingml/2006/main" xmlns:r="http://schemas.openxmlformats.org/officeDocument/2006/relationships" xmlns:p="http://schemas.openxmlformats.org/presentationml/2006/main">
   <p:cSld>
     <p:spTree>
@@ -5535,7 +5801,15 @@
           <a:p>
             <a:r>
               <a:rPr lang="en-US" dirty="0" smtClean="0"/>
-              <a:t>Jupyter Notebooks are a way to capture code, data, and textual markup</a:t>
+              <a:t>Jupyter Notebooks are a way to </a:t>
+            </a:r>
+            <a:r>
+              <a:rPr lang="en-US" dirty="0" smtClean="0"/>
+              <a:t>capture and present </a:t>
+            </a:r>
+            <a:r>
+              <a:rPr lang="en-US" dirty="0" smtClean="0"/>
+              <a:t>code, data, and textual markup</a:t>
             </a:r>
             <a:endParaRPr lang="en-US" dirty="0"/>
           </a:p>
@@ -5630,7 +5904,15 @@
           <a:p>
             <a:r>
               <a:rPr lang="en-US" dirty="0" smtClean="0"/>
-              <a:t>A-star search performed 4x better than breath-first</a:t>
+              <a:t>A-star search performed 4x better than </a:t>
+            </a:r>
+            <a:r>
+              <a:rPr lang="en-US" dirty="0" smtClean="0"/>
+              <a:t>breadth</a:t>
+            </a:r>
+            <a:r>
+              <a:rPr lang="en-US" dirty="0" smtClean="0"/>
+              <a:t>-first</a:t>
             </a:r>
           </a:p>
           <a:p>
@@ -5876,71 +6158,40 @@
           <a:p>
             <a:r>
               <a:rPr lang="en-US" dirty="0" smtClean="0"/>
-              <a:t>Data Science and Data Engineering</a:t>
-            </a:r>
-            <a:endParaRPr lang="en-US" dirty="0"/>
-          </a:p>
-        </p:txBody>
-      </p:sp>
-      <p:sp>
-        <p:nvSpPr>
-          <p:cNvPr id="3" name="Content Placeholder 2"/>
-          <p:cNvSpPr>
-            <a:spLocks noGrp="1"/>
-          </p:cNvSpPr>
-          <p:nvPr>
-            <p:ph idx="1"/>
-          </p:nvPr>
-        </p:nvSpPr>
+              <a:t>Bayes Rule</a:t>
+            </a:r>
+            <a:endParaRPr lang="en-US" dirty="0"/>
+          </a:p>
+        </p:txBody>
+      </p:sp>
+      <p:pic>
+        <p:nvPicPr>
+          <p:cNvPr id="4" name="Picture 3"/>
+          <p:cNvPicPr>
+            <a:picLocks noChangeAspect="1"/>
+          </p:cNvPicPr>
+          <p:nvPr/>
+        </p:nvPicPr>
+        <p:blipFill>
+          <a:blip r:embed="rId2"/>
+          <a:stretch>
+            <a:fillRect/>
+          </a:stretch>
+        </p:blipFill>
         <p:spPr>
           <a:xfrm>
-            <a:off x="762000" y="1596413"/>
-            <a:ext cx="8077200" cy="4880587"/>
+            <a:off x="990600" y="1752600"/>
+            <a:ext cx="7379239" cy="3784600"/>
           </a:xfrm>
+          <a:prstGeom prst="rect">
+            <a:avLst/>
+          </a:prstGeom>
         </p:spPr>
-        <p:txBody>
-          <a:bodyPr>
-            <a:normAutofit fontScale="92500" lnSpcReduction="10000"/>
-          </a:bodyPr>
-          <a:lstStyle/>
-          <a:p>
-            <a:r>
-              <a:rPr lang="en-US" dirty="0" smtClean="0"/>
-              <a:t>Data Science deals with algorithms and models, to learn from information and derive new information</a:t>
-            </a:r>
-          </a:p>
-          <a:p>
-            <a:r>
-              <a:rPr lang="en-US" dirty="0" smtClean="0"/>
-              <a:t>Data Engineering deals with how to gather, cleanse, store, and query large data sets.</a:t>
-            </a:r>
-          </a:p>
-          <a:p>
-            <a:r>
-              <a:rPr lang="en-US" dirty="0" smtClean="0"/>
-              <a:t>We discussed (software) tools used for these functions</a:t>
-            </a:r>
-          </a:p>
-          <a:p>
-            <a:r>
-              <a:rPr lang="en-US" dirty="0" smtClean="0"/>
-              <a:t>Python is a common-used language because it is compact and extensible</a:t>
-            </a:r>
-          </a:p>
-          <a:p>
-            <a:pPr lvl="1"/>
-            <a:r>
-              <a:rPr lang="en-US" dirty="0" smtClean="0"/>
-              <a:t>We can load libraries of support functions (e.g., numpy)</a:t>
-            </a:r>
-            <a:endParaRPr lang="en-US" dirty="0"/>
-          </a:p>
-        </p:txBody>
-      </p:sp>
+      </p:pic>
     </p:spTree>
     <p:extLst>
       <p:ext uri="{BB962C8B-B14F-4D97-AF65-F5344CB8AC3E}">
-        <p14:creationId xmlns:p14="http://schemas.microsoft.com/office/powerpoint/2010/main" val="1172415717"/>
+        <p14:creationId xmlns:p14="http://schemas.microsoft.com/office/powerpoint/2010/main" val="1038822910"/>
       </p:ext>
     </p:extLst>
   </p:cSld>
@@ -5987,7 +6238,7 @@
           <a:p>
             <a:r>
               <a:rPr lang="en-US" dirty="0" smtClean="0"/>
-              <a:t>Machine Learning</a:t>
+              <a:t>Data Science and Data Engineering</a:t>
             </a:r>
             <a:endParaRPr lang="en-US" dirty="0"/>
           </a:p>
@@ -6003,24 +6254,46 @@
             <p:ph idx="1"/>
           </p:nvPr>
         </p:nvSpPr>
-        <p:spPr/>
-        <p:txBody>
-          <a:bodyPr/>
-          <a:lstStyle/>
-          <a:p>
-            <a:r>
-              <a:rPr lang="en-US" dirty="0" smtClean="0"/>
-              <a:t>Definition:</a:t>
-            </a:r>
-          </a:p>
-          <a:p>
-            <a:r>
-              <a:rPr lang="en-US" dirty="0"/>
-              <a:t>Machine learning is a field of computer science that often uses statistical techniques to give computer systems the ability to "learn" (e.g., progressively improve performance on a specific task) with data, without being explicitly programmed</a:t>
-            </a:r>
-            <a:r>
-              <a:rPr lang="en-US" dirty="0" smtClean="0"/>
-              <a:t>.</a:t>
+        <p:spPr>
+          <a:xfrm>
+            <a:off x="762000" y="1596413"/>
+            <a:ext cx="8077200" cy="4880587"/>
+          </a:xfrm>
+        </p:spPr>
+        <p:txBody>
+          <a:bodyPr>
+            <a:normAutofit fontScale="92500" lnSpcReduction="10000"/>
+          </a:bodyPr>
+          <a:lstStyle/>
+          <a:p>
+            <a:r>
+              <a:rPr lang="en-US" dirty="0" smtClean="0"/>
+              <a:t>Data Science deals with algorithms and models, to learn from information and derive new information</a:t>
+            </a:r>
+          </a:p>
+          <a:p>
+            <a:r>
+              <a:rPr lang="en-US" dirty="0" smtClean="0"/>
+              <a:t>Data Engineering deals with how to gather, cleanse, store, and query large data sets.</a:t>
+            </a:r>
+          </a:p>
+          <a:p>
+            <a:r>
+              <a:rPr lang="en-US" dirty="0" smtClean="0"/>
+              <a:t>We discussed (software) tools used for these functions</a:t>
+            </a:r>
+          </a:p>
+          <a:p>
+            <a:r>
+              <a:rPr lang="en-US" dirty="0" smtClean="0"/>
+              <a:t>Python is a common-used language because it is compact and extensible</a:t>
+            </a:r>
+          </a:p>
+          <a:p>
+            <a:pPr lvl="1"/>
+            <a:r>
+              <a:rPr lang="en-US" dirty="0" smtClean="0"/>
+              <a:t>We can load libraries of support functions (e.g., numpy)</a:t>
             </a:r>
             <a:endParaRPr lang="en-US" dirty="0"/>
           </a:p>
@@ -6029,7 +6302,7 @@
     </p:spTree>
     <p:extLst>
       <p:ext uri="{BB962C8B-B14F-4D97-AF65-F5344CB8AC3E}">
-        <p14:creationId xmlns:p14="http://schemas.microsoft.com/office/powerpoint/2010/main" val="331668223"/>
+        <p14:creationId xmlns:p14="http://schemas.microsoft.com/office/powerpoint/2010/main" val="1172415717"/>
       </p:ext>
     </p:extLst>
   </p:cSld>
@@ -6076,7 +6349,7 @@
           <a:p>
             <a:r>
               <a:rPr lang="en-US" dirty="0" smtClean="0"/>
-              <a:t>Example</a:t>
+              <a:t>Machine Learning</a:t>
             </a:r>
             <a:endParaRPr lang="en-US" dirty="0"/>
           </a:p>
@@ -6092,102 +6365,33 @@
             <p:ph idx="1"/>
           </p:nvPr>
         </p:nvSpPr>
-        <p:spPr>
-          <a:xfrm>
-            <a:off x="762000" y="1596413"/>
-            <a:ext cx="8077200" cy="5413987"/>
-          </a:xfrm>
-        </p:spPr>
-        <p:txBody>
-          <a:bodyPr>
-            <a:normAutofit fontScale="92500" lnSpcReduction="20000"/>
-          </a:bodyPr>
-          <a:lstStyle/>
-          <a:p>
-            <a:r>
-              <a:rPr lang="en-US" dirty="0" smtClean="0"/>
-              <a:t>Consider the problem deciding when to issue a mortgage/loan</a:t>
-            </a:r>
-          </a:p>
-          <a:p>
-            <a:pPr lvl="1"/>
-            <a:r>
-              <a:rPr lang="en-US" dirty="0" smtClean="0"/>
-              <a:t>The person may default on the loan</a:t>
-            </a:r>
-          </a:p>
-          <a:p>
-            <a:pPr lvl="1"/>
-            <a:r>
-              <a:rPr lang="en-US" dirty="0" smtClean="0"/>
-              <a:t>Can we predict this?</a:t>
-            </a:r>
-          </a:p>
-          <a:p>
-            <a:r>
-              <a:rPr lang="en-US" dirty="0" smtClean="0"/>
-              <a:t>Do we have a record of other loans, and the result of them?</a:t>
-            </a:r>
-          </a:p>
-          <a:p>
-            <a:pPr lvl="1"/>
-            <a:r>
-              <a:rPr lang="en-US" dirty="0" smtClean="0"/>
-              <a:t>Yes, we have a spreadsheet of 1000 loans, along with a flag indicating if they were defaulted</a:t>
-            </a:r>
-          </a:p>
-          <a:p>
-            <a:pPr lvl="1"/>
-            <a:r>
-              <a:rPr lang="en-US" dirty="0" smtClean="0"/>
-              <a:t>Also, information about the borrower:</a:t>
-            </a:r>
-          </a:p>
-          <a:p>
-            <a:pPr lvl="2"/>
-            <a:r>
-              <a:rPr lang="en-US" dirty="0" smtClean="0"/>
-              <a:t>Number of years employed</a:t>
-            </a:r>
-          </a:p>
-          <a:p>
-            <a:pPr lvl="2"/>
-            <a:r>
-              <a:rPr lang="en-US" dirty="0" smtClean="0"/>
-              <a:t>Debt/income ratio</a:t>
-            </a:r>
-          </a:p>
-          <a:p>
-            <a:pPr lvl="2"/>
-            <a:r>
-              <a:rPr lang="en-US" dirty="0" smtClean="0"/>
-              <a:t>Number of years at same address</a:t>
-            </a:r>
-          </a:p>
-          <a:p>
-            <a:pPr lvl="2"/>
-            <a:r>
-              <a:rPr lang="en-US" dirty="0" smtClean="0"/>
-              <a:t>Prior defaults</a:t>
-            </a:r>
-          </a:p>
-          <a:p>
-            <a:pPr lvl="2"/>
-            <a:r>
-              <a:rPr lang="en-US" dirty="0" smtClean="0"/>
-              <a:t>Renter or homeowner</a:t>
-            </a:r>
-          </a:p>
-          <a:p>
-            <a:pPr lvl="2"/>
-            <a:endParaRPr lang="en-US" dirty="0" smtClean="0"/>
+        <p:spPr/>
+        <p:txBody>
+          <a:bodyPr/>
+          <a:lstStyle/>
+          <a:p>
+            <a:r>
+              <a:rPr lang="en-US" dirty="0" smtClean="0"/>
+              <a:t>Definition:</a:t>
+            </a:r>
+          </a:p>
+          <a:p>
+            <a:r>
+              <a:rPr lang="en-US" dirty="0"/>
+              <a:t>Machine learning is a field of computer science that often uses statistical techniques to give computer systems the ability to "learn" (e.g., progressively improve performance on a specific task) with data, without being explicitly programmed</a:t>
+            </a:r>
+            <a:r>
+              <a:rPr lang="en-US" dirty="0" smtClean="0"/>
+              <a:t>.</a:t>
+            </a:r>
+            <a:endParaRPr lang="en-US" dirty="0"/>
           </a:p>
         </p:txBody>
       </p:sp>
     </p:spTree>
     <p:extLst>
       <p:ext uri="{BB962C8B-B14F-4D97-AF65-F5344CB8AC3E}">
-        <p14:creationId xmlns:p14="http://schemas.microsoft.com/office/powerpoint/2010/main" val="1814776964"/>
+        <p14:creationId xmlns:p14="http://schemas.microsoft.com/office/powerpoint/2010/main" val="331668223"/>
       </p:ext>
     </p:extLst>
   </p:cSld>
@@ -6234,40 +6438,118 @@
           <a:p>
             <a:r>
               <a:rPr lang="en-US" dirty="0" smtClean="0"/>
-              <a:t>Data Set</a:t>
-            </a:r>
-            <a:endParaRPr lang="en-US" dirty="0"/>
-          </a:p>
-        </p:txBody>
-      </p:sp>
-      <p:pic>
-        <p:nvPicPr>
-          <p:cNvPr id="7" name="Picture 6"/>
-          <p:cNvPicPr>
-            <a:picLocks noChangeAspect="1"/>
-          </p:cNvPicPr>
-          <p:nvPr/>
-        </p:nvPicPr>
-        <p:blipFill>
-          <a:blip r:embed="rId2"/>
-          <a:stretch>
-            <a:fillRect/>
-          </a:stretch>
-        </p:blipFill>
+              <a:t>Example</a:t>
+            </a:r>
+            <a:endParaRPr lang="en-US" dirty="0"/>
+          </a:p>
+        </p:txBody>
+      </p:sp>
+      <p:sp>
+        <p:nvSpPr>
+          <p:cNvPr id="3" name="Content Placeholder 2"/>
+          <p:cNvSpPr>
+            <a:spLocks noGrp="1"/>
+          </p:cNvSpPr>
+          <p:nvPr>
+            <p:ph idx="1"/>
+          </p:nvPr>
+        </p:nvSpPr>
         <p:spPr>
           <a:xfrm>
-            <a:off x="0" y="1765300"/>
-            <a:ext cx="9144000" cy="3325091"/>
+            <a:off x="762000" y="1596413"/>
+            <a:ext cx="8077200" cy="5413987"/>
           </a:xfrm>
-          <a:prstGeom prst="rect">
-            <a:avLst/>
-          </a:prstGeom>
         </p:spPr>
-      </p:pic>
+        <p:txBody>
+          <a:bodyPr>
+            <a:normAutofit fontScale="92500" lnSpcReduction="20000"/>
+          </a:bodyPr>
+          <a:lstStyle/>
+          <a:p>
+            <a:r>
+              <a:rPr lang="en-US" dirty="0" smtClean="0"/>
+              <a:t>Consider the problem deciding when to issue a mortgage/loan</a:t>
+            </a:r>
+          </a:p>
+          <a:p>
+            <a:pPr lvl="1"/>
+            <a:r>
+              <a:rPr lang="en-US" dirty="0" smtClean="0"/>
+              <a:t>The person may default on the loan</a:t>
+            </a:r>
+          </a:p>
+          <a:p>
+            <a:pPr lvl="1"/>
+            <a:r>
+              <a:rPr lang="en-US" dirty="0" smtClean="0"/>
+              <a:t>Can we predict this?</a:t>
+            </a:r>
+          </a:p>
+          <a:p>
+            <a:r>
+              <a:rPr lang="en-US" dirty="0" smtClean="0"/>
+              <a:t>Do we have a record of other loans, and the result of them?</a:t>
+            </a:r>
+          </a:p>
+          <a:p>
+            <a:pPr lvl="1"/>
+            <a:r>
+              <a:rPr lang="en-US" dirty="0" smtClean="0"/>
+              <a:t>Yes, we have a spreadsheet of 1000 loans, along with a flag indicating if they were defaulted</a:t>
+            </a:r>
+          </a:p>
+          <a:p>
+            <a:pPr lvl="1"/>
+            <a:r>
+              <a:rPr lang="en-US" dirty="0" smtClean="0"/>
+              <a:t>Also, information about the borrower:</a:t>
+            </a:r>
+          </a:p>
+          <a:p>
+            <a:pPr lvl="2"/>
+            <a:r>
+              <a:rPr lang="en-US" dirty="0" smtClean="0"/>
+              <a:t>Number of years employed</a:t>
+            </a:r>
+          </a:p>
+          <a:p>
+            <a:pPr lvl="2"/>
+            <a:r>
+              <a:rPr lang="en-US" dirty="0" smtClean="0"/>
+              <a:t>Debt/income ratio</a:t>
+            </a:r>
+          </a:p>
+          <a:p>
+            <a:pPr lvl="2"/>
+            <a:r>
+              <a:rPr lang="en-US" dirty="0" smtClean="0"/>
+              <a:t>Number of years at same address</a:t>
+            </a:r>
+          </a:p>
+          <a:p>
+            <a:pPr lvl="2"/>
+            <a:r>
+              <a:rPr lang="en-US" dirty="0" smtClean="0"/>
+              <a:t>Prior defaults</a:t>
+            </a:r>
+          </a:p>
+          <a:p>
+            <a:pPr lvl="2"/>
+            <a:r>
+              <a:rPr lang="en-US" dirty="0" smtClean="0"/>
+              <a:t>Renter or homeowner</a:t>
+            </a:r>
+          </a:p>
+          <a:p>
+            <a:pPr lvl="2"/>
+            <a:endParaRPr lang="en-US" dirty="0" smtClean="0"/>
+          </a:p>
+        </p:txBody>
+      </p:sp>
     </p:spTree>
     <p:extLst>
       <p:ext uri="{BB962C8B-B14F-4D97-AF65-F5344CB8AC3E}">
-        <p14:creationId xmlns:p14="http://schemas.microsoft.com/office/powerpoint/2010/main" val="81726588"/>
+        <p14:creationId xmlns:p14="http://schemas.microsoft.com/office/powerpoint/2010/main" val="1814776964"/>
       </p:ext>
     </p:extLst>
   </p:cSld>
@@ -6314,113 +6596,40 @@
           <a:p>
             <a:r>
               <a:rPr lang="en-US" dirty="0" smtClean="0"/>
-              <a:t>Prediction model</a:t>
-            </a:r>
-            <a:endParaRPr lang="en-US" dirty="0"/>
-          </a:p>
-        </p:txBody>
-      </p:sp>
-      <p:sp>
-        <p:nvSpPr>
-          <p:cNvPr id="3" name="Content Placeholder 2"/>
-          <p:cNvSpPr>
-            <a:spLocks noGrp="1"/>
-          </p:cNvSpPr>
-          <p:nvPr>
-            <p:ph idx="1"/>
-          </p:nvPr>
-        </p:nvSpPr>
-        <p:spPr/>
-        <p:txBody>
-          <a:bodyPr>
-            <a:normAutofit fontScale="62500" lnSpcReduction="20000"/>
-          </a:bodyPr>
-          <a:lstStyle/>
-          <a:p>
-            <a:r>
-              <a:rPr lang="en-US" dirty="0" smtClean="0"/>
-              <a:t>Simple:  if homeowner, loan will be good</a:t>
-            </a:r>
-          </a:p>
-          <a:p>
-            <a:endParaRPr lang="en-US" dirty="0" smtClean="0"/>
-          </a:p>
-          <a:p>
-            <a:r>
-              <a:rPr lang="en-US" dirty="0" smtClean="0"/>
-              <a:t>Better:  if homeowner and employed, loan will be good</a:t>
-            </a:r>
-          </a:p>
-          <a:p>
-            <a:endParaRPr lang="en-US" dirty="0" smtClean="0"/>
-          </a:p>
-          <a:p>
-            <a:r>
-              <a:rPr lang="en-US" dirty="0" smtClean="0"/>
-              <a:t>Better:  P(good) = 0.3 * (1 if homeowner) +0 .7 * (1 if employed)  </a:t>
-            </a:r>
-            <a:endParaRPr lang="en-US" dirty="0"/>
-          </a:p>
-          <a:p>
-            <a:endParaRPr lang="en-US" dirty="0" smtClean="0"/>
-          </a:p>
-          <a:p>
-            <a:endParaRPr lang="en-US" dirty="0"/>
-          </a:p>
-          <a:p>
-            <a:r>
-              <a:rPr lang="en-US" dirty="0" smtClean="0"/>
-              <a:t>In </a:t>
-            </a:r>
-            <a:r>
-              <a:rPr lang="en-US" dirty="0"/>
-              <a:t>general, the computed probability that a loan will be good is:</a:t>
-            </a:r>
-          </a:p>
-          <a:p>
-            <a:pPr marL="0" indent="0">
-              <a:buNone/>
-            </a:pPr>
-            <a:endParaRPr lang="en-US" dirty="0"/>
-          </a:p>
-          <a:p>
-            <a:pPr lvl="1"/>
-            <a:r>
-              <a:rPr lang="en-US" dirty="0"/>
-              <a:t> </a:t>
-            </a:r>
-            <a:r>
-              <a:rPr lang="en-US" dirty="0" smtClean="0"/>
-              <a:t>P</a:t>
-            </a:r>
-            <a:r>
-              <a:rPr lang="en-US" dirty="0"/>
-              <a:t>(good) = alpha1 * feature1 + alpha2 * feature2 + alpha3 * feature3 + …</a:t>
-            </a:r>
-          </a:p>
-          <a:p>
-            <a:endParaRPr lang="en-US" dirty="0"/>
-          </a:p>
-          <a:p>
-            <a:r>
-              <a:rPr lang="en-US" dirty="0"/>
-              <a:t>We need to select the most useful features, and we need to find the best values of the alphas using the training data </a:t>
-            </a:r>
-            <a:r>
-              <a:rPr lang="en-US" dirty="0" smtClean="0"/>
-              <a:t>set.</a:t>
-            </a:r>
-            <a:endParaRPr lang="en-US" dirty="0"/>
-          </a:p>
-          <a:p>
-            <a:endParaRPr lang="en-US" dirty="0"/>
-          </a:p>
-        </p:txBody>
-      </p:sp>
+              <a:t>Data Set</a:t>
+            </a:r>
+            <a:endParaRPr lang="en-US" dirty="0"/>
+          </a:p>
+        </p:txBody>
+      </p:sp>
+      <p:pic>
+        <p:nvPicPr>
+          <p:cNvPr id="7" name="Picture 6"/>
+          <p:cNvPicPr>
+            <a:picLocks noChangeAspect="1"/>
+          </p:cNvPicPr>
+          <p:nvPr/>
+        </p:nvPicPr>
+        <p:blipFill>
+          <a:blip r:embed="rId2"/>
+          <a:stretch>
+            <a:fillRect/>
+          </a:stretch>
+        </p:blipFill>
+        <p:spPr>
+          <a:xfrm>
+            <a:off x="0" y="1765300"/>
+            <a:ext cx="9144000" cy="3325091"/>
+          </a:xfrm>
+          <a:prstGeom prst="rect">
+            <a:avLst/>
+          </a:prstGeom>
+        </p:spPr>
+      </p:pic>
     </p:spTree>
     <p:extLst>
       <p:ext uri="{BB962C8B-B14F-4D97-AF65-F5344CB8AC3E}">
-        <p14:creationId xmlns:p14="http://schemas.microsoft.com/office/powerpoint/2010/main" val="3273536355"/>
+        <p14:creationId xmlns:p14="http://schemas.microsoft.com/office/powerpoint/2010/main" val="81726588"/>
       </p:ext>
     </p:extLst>
   </p:cSld>

</xml_diff>

<commit_message>
fixed one typo on slides
</commit_message>
<xml_diff>
--- a/Documents/60-Introduction.pptx
+++ b/Documents/60-Introduction.pptx
@@ -214,7 +214,7 @@
             <a:fld id="{D83FDC75-7F73-4A4A-A77C-09AADF00E0EA}" type="datetimeFigureOut">
               <a:rPr lang="en-US" smtClean="0"/>
               <a:pPr/>
-              <a:t>5/18/18</a:t>
+              <a:t>5/19/18</a:t>
             </a:fld>
             <a:endParaRPr lang="en-US" dirty="0"/>
           </a:p>
@@ -381,7 +381,7 @@
             <a:fld id="{48AEF76B-3757-4A0B-AF93-28494465C1DD}" type="datetimeFigureOut">
               <a:rPr lang="en-US" smtClean="0"/>
               <a:pPr/>
-              <a:t>5/18/18</a:t>
+              <a:t>5/19/18</a:t>
             </a:fld>
             <a:endParaRPr lang="en-US" dirty="0"/>
           </a:p>
@@ -1351,7 +1351,7 @@
             <a:fld id="{757B281C-5159-4971-8228-52B9A72E9ED2}" type="datetimeFigureOut">
               <a:rPr lang="en-US" smtClean="0"/>
               <a:pPr/>
-              <a:t>5/18/18</a:t>
+              <a:t>5/19/18</a:t>
             </a:fld>
             <a:endParaRPr lang="en-US" dirty="0"/>
           </a:p>
@@ -1453,7 +1453,7 @@
             <a:fld id="{757B281C-5159-4971-8228-52B9A72E9ED2}" type="datetimeFigureOut">
               <a:rPr lang="en-US" smtClean="0"/>
               <a:pPr/>
-              <a:t>5/18/18</a:t>
+              <a:t>5/19/18</a:t>
             </a:fld>
             <a:endParaRPr lang="en-US" dirty="0"/>
           </a:p>
@@ -1589,7 +1589,7 @@
             <a:fld id="{757B281C-5159-4971-8228-52B9A72E9ED2}" type="datetimeFigureOut">
               <a:rPr lang="en-US" smtClean="0"/>
               <a:pPr/>
-              <a:t>5/18/18</a:t>
+              <a:t>5/19/18</a:t>
             </a:fld>
             <a:endParaRPr lang="en-US" dirty="0"/>
           </a:p>
@@ -1795,7 +1795,7 @@
             <a:fld id="{757B281C-5159-4971-8228-52B9A72E9ED2}" type="datetimeFigureOut">
               <a:rPr lang="en-US" smtClean="0"/>
               <a:pPr/>
-              <a:t>5/18/18</a:t>
+              <a:t>5/19/18</a:t>
             </a:fld>
             <a:endParaRPr lang="en-US" dirty="0"/>
           </a:p>
@@ -2175,7 +2175,7 @@
             <a:fld id="{757B281C-5159-4971-8228-52B9A72E9ED2}" type="datetimeFigureOut">
               <a:rPr lang="en-US" smtClean="0"/>
               <a:pPr/>
-              <a:t>5/18/18</a:t>
+              <a:t>5/19/18</a:t>
             </a:fld>
             <a:endParaRPr lang="en-US" dirty="0"/>
           </a:p>
@@ -2475,7 +2475,7 @@
             <a:fld id="{757B281C-5159-4971-8228-52B9A72E9ED2}" type="datetimeFigureOut">
               <a:rPr lang="en-US" smtClean="0"/>
               <a:pPr/>
-              <a:t>5/18/18</a:t>
+              <a:t>5/19/18</a:t>
             </a:fld>
             <a:endParaRPr lang="en-US" dirty="0"/>
           </a:p>
@@ -2904,7 +2904,7 @@
             <a:fld id="{757B281C-5159-4971-8228-52B9A72E9ED2}" type="datetimeFigureOut">
               <a:rPr lang="en-US" smtClean="0"/>
               <a:pPr/>
-              <a:t>5/18/18</a:t>
+              <a:t>5/19/18</a:t>
             </a:fld>
             <a:endParaRPr lang="en-US" dirty="0"/>
           </a:p>
@@ -3181,7 +3181,7 @@
             <a:fld id="{757B281C-5159-4971-8228-52B9A72E9ED2}" type="datetimeFigureOut">
               <a:rPr lang="en-US" smtClean="0"/>
               <a:pPr/>
-              <a:t>5/18/18</a:t>
+              <a:t>5/19/18</a:t>
             </a:fld>
             <a:endParaRPr lang="en-US" dirty="0"/>
           </a:p>
@@ -3445,7 +3445,7 @@
             <a:fld id="{757B281C-5159-4971-8228-52B9A72E9ED2}" type="datetimeFigureOut">
               <a:rPr lang="en-US" smtClean="0"/>
               <a:pPr/>
-              <a:t>5/18/18</a:t>
+              <a:t>5/19/18</a:t>
             </a:fld>
             <a:endParaRPr lang="en-US" dirty="0"/>
           </a:p>
@@ -3615,7 +3615,7 @@
             <a:fld id="{757B281C-5159-4971-8228-52B9A72E9ED2}" type="datetimeFigureOut">
               <a:rPr lang="en-US" smtClean="0"/>
               <a:pPr/>
-              <a:t>5/18/18</a:t>
+              <a:t>5/19/18</a:t>
             </a:fld>
             <a:endParaRPr lang="en-US" dirty="0"/>
           </a:p>
@@ -3795,7 +3795,7 @@
             <a:fld id="{757B281C-5159-4971-8228-52B9A72E9ED2}" type="datetimeFigureOut">
               <a:rPr lang="en-US" smtClean="0"/>
               <a:pPr/>
-              <a:t>5/18/18</a:t>
+              <a:t>5/19/18</a:t>
             </a:fld>
             <a:endParaRPr lang="en-US" dirty="0"/>
           </a:p>
@@ -4037,7 +4037,7 @@
             <a:fld id="{757B281C-5159-4971-8228-52B9A72E9ED2}" type="datetimeFigureOut">
               <a:rPr lang="en-US" smtClean="0"/>
               <a:pPr/>
-              <a:t>5/18/18</a:t>
+              <a:t>5/19/18</a:t>
             </a:fld>
             <a:endParaRPr lang="en-US" dirty="0"/>
           </a:p>
@@ -4784,7 +4784,11 @@
           <a:p>
             <a:r>
               <a:rPr lang="en-US" dirty="0" smtClean="0"/>
-              <a:t>How to determine the alpha’s</a:t>
+              <a:t>How to determine the </a:t>
+            </a:r>
+            <a:r>
+              <a:rPr lang="en-US" dirty="0" smtClean="0"/>
+              <a:t>thetas</a:t>
             </a:r>
             <a:endParaRPr lang="en-US" dirty="0"/>
           </a:p>
@@ -4809,13 +4813,8 @@
           <a:p>
             <a:r>
               <a:rPr lang="en-US" dirty="0" smtClean="0"/>
-              <a:t>Suppose you start with </a:t>
-            </a:r>
-            <a:r>
-              <a:rPr lang="en-US" dirty="0" smtClean="0"/>
-              <a:t>[theta1=0.3, theta2=0.7]</a:t>
-            </a:r>
-            <a:endParaRPr lang="en-US" dirty="0" smtClean="0"/>
+              <a:t>Suppose you start with [theta1=0.3, theta2=0.7]</a:t>
+            </a:r>
           </a:p>
           <a:p>
             <a:r>
@@ -4827,38 +4826,13 @@
             <a:pPr lvl="1"/>
             <a:r>
               <a:rPr lang="en-US" dirty="0" smtClean="0"/>
-              <a:t>We call this the </a:t>
-            </a:r>
-            <a:r>
-              <a:rPr lang="en-US" dirty="0" smtClean="0"/>
-              <a:t>“cost” </a:t>
-            </a:r>
-            <a:r>
-              <a:rPr lang="en-US" dirty="0" smtClean="0"/>
-              <a:t>or </a:t>
-            </a:r>
-            <a:r>
-              <a:rPr lang="en-US" dirty="0" smtClean="0"/>
-              <a:t>“</a:t>
-            </a:r>
-            <a:r>
-              <a:rPr lang="en-US" dirty="0" smtClean="0"/>
-              <a:t>loss</a:t>
-            </a:r>
-            <a:r>
-              <a:rPr lang="en-US" dirty="0" smtClean="0"/>
-              <a:t>”</a:t>
-            </a:r>
-            <a:endParaRPr lang="en-US" dirty="0" smtClean="0"/>
-          </a:p>
-          <a:p>
-            <a:r>
-              <a:rPr lang="en-US" dirty="0" smtClean="0"/>
-              <a:t>We can also calculate the first derivative </a:t>
-            </a:r>
-            <a:r>
-              <a:rPr lang="en-US" dirty="0" smtClean="0"/>
-              <a:t>of cost </a:t>
+              <a:t>We call this the “cost” or “loss”</a:t>
+            </a:r>
+          </a:p>
+          <a:p>
+            <a:r>
+              <a:rPr lang="en-US" dirty="0" smtClean="0"/>
+              <a:t>We can also calculate the first derivative of cost </a:t>
             </a:r>
             <a:r>
               <a:rPr lang="en-US" dirty="0" err="1" smtClean="0"/>
@@ -4866,21 +4840,8 @@
             </a:r>
             <a:r>
               <a:rPr lang="en-US" dirty="0" smtClean="0"/>
-              <a:t>. </a:t>
-            </a:r>
-            <a:r>
-              <a:rPr lang="en-US" dirty="0" smtClean="0"/>
-              <a:t>theta1 and </a:t>
-            </a:r>
-            <a:r>
-              <a:rPr lang="en-US" dirty="0" smtClean="0"/>
-              <a:t>also </a:t>
-            </a:r>
-            <a:r>
-              <a:rPr lang="en-US" dirty="0" smtClean="0"/>
-              <a:t>theta2</a:t>
-            </a:r>
-            <a:endParaRPr lang="en-US" dirty="0" smtClean="0"/>
+              <a:t>. theta1 and also theta2</a:t>
+            </a:r>
           </a:p>
           <a:p>
             <a:r>
@@ -4944,11 +4905,7 @@
           <a:p>
             <a:r>
               <a:rPr lang="en-US" dirty="0" smtClean="0"/>
-              <a:t>Taking Iterative </a:t>
-            </a:r>
-            <a:r>
-              <a:rPr lang="en-US" dirty="0" smtClean="0"/>
-              <a:t>Steps</a:t>
+              <a:t>Taking Iterative Steps</a:t>
             </a:r>
             <a:endParaRPr lang="en-US" dirty="0"/>
           </a:p>
@@ -5110,15 +5067,7 @@
           <a:p>
             <a:r>
               <a:rPr lang="en-US" dirty="0" smtClean="0"/>
-              <a:t>The </a:t>
-            </a:r>
-            <a:r>
-              <a:rPr lang="en-US" dirty="0" smtClean="0"/>
-              <a:t>cost (error) </a:t>
-            </a:r>
-            <a:r>
-              <a:rPr lang="en-US" dirty="0" smtClean="0"/>
-              <a:t>will be reduced for each iteration</a:t>
+              <a:t>The cost (error) will be reduced for each iteration</a:t>
             </a:r>
             <a:endParaRPr lang="en-US" dirty="0"/>
           </a:p>
@@ -5228,21 +5177,8 @@
           <a:p>
             <a:r>
               <a:rPr lang="en-US" dirty="0" smtClean="0"/>
-              <a:t>Extending from 2 </a:t>
-            </a:r>
-            <a:r>
-              <a:rPr lang="en-US" dirty="0" smtClean="0"/>
-              <a:t>thetas to </a:t>
-            </a:r>
-            <a:r>
-              <a:rPr lang="en-US" dirty="0" smtClean="0"/>
-              <a:t>several </a:t>
-            </a:r>
-            <a:r>
-              <a:rPr lang="en-US" dirty="0" smtClean="0"/>
-              <a:t>thetas.  Call them “weights”.</a:t>
-            </a:r>
-            <a:endParaRPr lang="en-US" dirty="0" smtClean="0"/>
+              <a:t>Extending from 2 thetas to several thetas.  Call them “weights”.</a:t>
+            </a:r>
           </a:p>
           <a:p>
             <a:endParaRPr lang="en-US" dirty="0"/>
@@ -5380,11 +5316,7 @@
             </a:r>
             <a:r>
               <a:rPr lang="en-US" dirty="0" smtClean="0"/>
-              <a:t>0.18 </a:t>
-            </a:r>
-            <a:r>
-              <a:rPr lang="en-US" dirty="0" smtClean="0"/>
-              <a:t>* debt/</a:t>
+              <a:t>0.18 * debt/</a:t>
             </a:r>
             <a:r>
               <a:rPr lang="en-US" dirty="0" err="1" smtClean="0"/>
@@ -5451,15 +5383,7 @@
           <a:p>
             <a:r>
               <a:rPr lang="en-US" dirty="0" smtClean="0"/>
-              <a:t>This model shows the most important features.  We </a:t>
-            </a:r>
-            <a:r>
-              <a:rPr lang="en-US" dirty="0" smtClean="0"/>
-              <a:t>will find via training thetas for </a:t>
-            </a:r>
-            <a:r>
-              <a:rPr lang="en-US" dirty="0" smtClean="0"/>
-              <a:t>all 60+ features, but we will keep only those with the high coefficients.</a:t>
+              <a:t>This model shows the most important features.  We will find via training thetas for all 60+ features, but we will keep only those with the high coefficients.</a:t>
             </a:r>
           </a:p>
         </p:txBody>
@@ -5801,15 +5725,7 @@
           <a:p>
             <a:r>
               <a:rPr lang="en-US" dirty="0" smtClean="0"/>
-              <a:t>Jupyter Notebooks are a way to </a:t>
-            </a:r>
-            <a:r>
-              <a:rPr lang="en-US" dirty="0" smtClean="0"/>
-              <a:t>capture and present </a:t>
-            </a:r>
-            <a:r>
-              <a:rPr lang="en-US" dirty="0" smtClean="0"/>
-              <a:t>code, data, and textual markup</a:t>
+              <a:t>Jupyter Notebooks are a way to capture and present code, data, and textual markup</a:t>
             </a:r>
             <a:endParaRPr lang="en-US" dirty="0"/>
           </a:p>
@@ -5904,15 +5820,7 @@
           <a:p>
             <a:r>
               <a:rPr lang="en-US" dirty="0" smtClean="0"/>
-              <a:t>A-star search performed 4x better than </a:t>
-            </a:r>
-            <a:r>
-              <a:rPr lang="en-US" dirty="0" smtClean="0"/>
-              <a:t>breadth</a:t>
-            </a:r>
-            <a:r>
-              <a:rPr lang="en-US" dirty="0" smtClean="0"/>
-              <a:t>-first</a:t>
+              <a:t>A-star search performed 4x better than breadth-first</a:t>
             </a:r>
           </a:p>
           <a:p>

</xml_diff>